<commit_message>
Add final assignment part 2
</commit_message>
<xml_diff>
--- a/slides/final_assignment_2015_part_1.pptx
+++ b/slides/final_assignment_2015_part_1.pptx
@@ -5,7 +5,7 @@
     <p:sldMasterId id="2147483660" r:id="rId1"/>
   </p:sldMasterIdLst>
   <p:notesMasterIdLst>
-    <p:notesMasterId r:id="rId10"/>
+    <p:notesMasterId r:id="rId9"/>
   </p:notesMasterIdLst>
   <p:sldIdLst>
     <p:sldId id="256" r:id="rId2"/>
@@ -15,7 +15,6 @@
     <p:sldId id="309" r:id="rId6"/>
     <p:sldId id="308" r:id="rId7"/>
     <p:sldId id="311" r:id="rId8"/>
-    <p:sldId id="304" r:id="rId9"/>
   </p:sldIdLst>
   <p:sldSz cx="9144000" cy="6858000" type="screen4x3"/>
   <p:notesSz cx="7099300" cy="10234613"/>
@@ -204,7 +203,7 @@
           <a:p>
             <a:fld id="{8A6B91D2-9E79-412C-A7F0-44859A33EAAA}" type="datetimeFigureOut">
               <a:rPr lang="en-US" smtClean="0"/>
-              <a:t>11/23/2015</a:t>
+              <a:t>12/7/2015</a:t>
             </a:fld>
             <a:endParaRPr lang="en-US" dirty="0"/>
           </a:p>
@@ -724,90 +723,6 @@
 </p:notes>
 </file>
 
-<file path=ppt/notesSlides/notesSlide4.xml><?xml version="1.0" encoding="utf-8"?>
-<p:notes xmlns:a="http://schemas.openxmlformats.org/drawingml/2006/main" xmlns:r="http://schemas.openxmlformats.org/officeDocument/2006/relationships" xmlns:p="http://schemas.openxmlformats.org/presentationml/2006/main">
-  <p:cSld>
-    <p:spTree>
-      <p:nvGrpSpPr>
-        <p:cNvPr id="1" name=""/>
-        <p:cNvGrpSpPr/>
-        <p:nvPr/>
-      </p:nvGrpSpPr>
-      <p:grpSpPr>
-        <a:xfrm>
-          <a:off x="0" y="0"/>
-          <a:ext cx="0" cy="0"/>
-          <a:chOff x="0" y="0"/>
-          <a:chExt cx="0" cy="0"/>
-        </a:xfrm>
-      </p:grpSpPr>
-      <p:sp>
-        <p:nvSpPr>
-          <p:cNvPr id="2" name="Slide Image Placeholder 1"/>
-          <p:cNvSpPr>
-            <a:spLocks noGrp="1" noRot="1" noChangeAspect="1"/>
-          </p:cNvSpPr>
-          <p:nvPr>
-            <p:ph type="sldImg"/>
-          </p:nvPr>
-        </p:nvSpPr>
-        <p:spPr/>
-      </p:sp>
-      <p:sp>
-        <p:nvSpPr>
-          <p:cNvPr id="3" name="Notes Placeholder 2"/>
-          <p:cNvSpPr>
-            <a:spLocks noGrp="1"/>
-          </p:cNvSpPr>
-          <p:nvPr>
-            <p:ph type="body" idx="1"/>
-          </p:nvPr>
-        </p:nvSpPr>
-        <p:spPr/>
-        <p:txBody>
-          <a:bodyPr/>
-          <a:lstStyle/>
-          <a:p>
-            <a:endParaRPr lang="en-US" dirty="0"/>
-          </a:p>
-        </p:txBody>
-      </p:sp>
-      <p:sp>
-        <p:nvSpPr>
-          <p:cNvPr id="4" name="Slide Number Placeholder 3"/>
-          <p:cNvSpPr>
-            <a:spLocks noGrp="1"/>
-          </p:cNvSpPr>
-          <p:nvPr>
-            <p:ph type="sldNum" sz="quarter" idx="10"/>
-          </p:nvPr>
-        </p:nvSpPr>
-        <p:spPr/>
-        <p:txBody>
-          <a:bodyPr/>
-          <a:lstStyle/>
-          <a:p>
-            <a:fld id="{0B55B0A3-D39E-41A6-94A4-2DD56B9D1295}" type="slidenum">
-              <a:rPr lang="en-US" smtClean="0"/>
-              <a:t>8</a:t>
-            </a:fld>
-            <a:endParaRPr lang="en-US" dirty="0"/>
-          </a:p>
-        </p:txBody>
-      </p:sp>
-    </p:spTree>
-    <p:extLst>
-      <p:ext uri="{BB962C8B-B14F-4D97-AF65-F5344CB8AC3E}">
-        <p14:creationId xmlns:p14="http://schemas.microsoft.com/office/powerpoint/2010/main" val="1424421366"/>
-      </p:ext>
-    </p:extLst>
-  </p:cSld>
-  <p:clrMapOvr>
-    <a:masterClrMapping/>
-  </p:clrMapOvr>
-</p:notes>
-</file>
-
 <file path=ppt/slideLayouts/slideLayout1.xml><?xml version="1.0" encoding="utf-8"?>
 <p:sldLayout xmlns:a="http://schemas.openxmlformats.org/drawingml/2006/main" xmlns:r="http://schemas.openxmlformats.org/officeDocument/2006/relationships" xmlns:p="http://schemas.openxmlformats.org/presentationml/2006/main" type="title" preserve="1">
   <p:cSld name="titeldia rood">
@@ -1009,7 +924,7 @@
           <a:p>
             <a:fld id="{AD3B9B2E-78D5-485D-A6F0-B187A4DDDF47}" type="datetime1">
               <a:rPr lang="en-US" smtClean="0"/>
-              <a:t>11/23/2015</a:t>
+              <a:t>12/7/2015</a:t>
             </a:fld>
             <a:endParaRPr lang="en-US" dirty="0"/>
           </a:p>
@@ -1148,7 +1063,7 @@
           <a:p>
             <a:fld id="{D5A17E2C-6156-456C-A622-3A32F4BE83F2}" type="datetime1">
               <a:rPr lang="en-US" smtClean="0"/>
-              <a:t>11/23/2015</a:t>
+              <a:t>12/7/2015</a:t>
             </a:fld>
             <a:endParaRPr lang="en-US" dirty="0"/>
           </a:p>
@@ -1264,7 +1179,7 @@
           <a:p>
             <a:fld id="{0B713CFA-AFAD-4538-AA5D-CFB423E6D282}" type="datetime1">
               <a:rPr lang="en-US" smtClean="0"/>
-              <a:t>11/23/2015</a:t>
+              <a:t>12/7/2015</a:t>
             </a:fld>
             <a:endParaRPr lang="en-US" dirty="0"/>
           </a:p>
@@ -1562,7 +1477,7 @@
           <a:p>
             <a:fld id="{AD41C741-CF18-4F4B-A360-E0CC354E7B30}" type="datetime1">
               <a:rPr lang="en-US" smtClean="0"/>
-              <a:t>11/23/2015</a:t>
+              <a:t>12/7/2015</a:t>
             </a:fld>
             <a:endParaRPr lang="en-US" dirty="0"/>
           </a:p>
@@ -1840,7 +1755,7 @@
           <a:p>
             <a:fld id="{F291C3E4-1B80-4765-A130-AB5527270AB1}" type="datetime1">
               <a:rPr lang="en-US" smtClean="0"/>
-              <a:t>11/23/2015</a:t>
+              <a:t>12/7/2015</a:t>
             </a:fld>
             <a:endParaRPr lang="en-US" dirty="0"/>
           </a:p>
@@ -2031,7 +1946,7 @@
           <a:p>
             <a:fld id="{FD262526-7610-4673-941F-CC74A1538ACF}" type="datetime1">
               <a:rPr lang="en-US" smtClean="0"/>
-              <a:t>11/23/2015</a:t>
+              <a:t>12/7/2015</a:t>
             </a:fld>
             <a:endParaRPr lang="en-US" dirty="0"/>
           </a:p>
@@ -2232,7 +2147,7 @@
           <a:p>
             <a:fld id="{118EEA14-5288-4929-8EB4-C2AFA9E01B25}" type="datetime1">
               <a:rPr lang="en-US" smtClean="0"/>
-              <a:t>11/23/2015</a:t>
+              <a:t>12/7/2015</a:t>
             </a:fld>
             <a:endParaRPr lang="en-US" dirty="0"/>
           </a:p>
@@ -2495,7 +2410,7 @@
           <a:p>
             <a:fld id="{29FE0FD4-9793-40E5-9CE1-4FFB9A5AFE1A}" type="datetime1">
               <a:rPr lang="en-US" smtClean="0"/>
-              <a:t>11/23/2015</a:t>
+              <a:t>12/7/2015</a:t>
             </a:fld>
             <a:endParaRPr lang="en-US" dirty="0"/>
           </a:p>
@@ -2686,7 +2601,7 @@
           <a:p>
             <a:fld id="{83E5DE47-8504-4660-8E21-48372A496086}" type="datetime1">
               <a:rPr lang="en-US" smtClean="0"/>
-              <a:t>11/23/2015</a:t>
+              <a:t>12/7/2015</a:t>
             </a:fld>
             <a:endParaRPr lang="en-US" dirty="0"/>
           </a:p>
@@ -2882,7 +2797,7 @@
           <a:p>
             <a:fld id="{233900AF-2196-49C2-B5FC-E504BFCFB518}" type="datetime1">
               <a:rPr lang="en-US" smtClean="0"/>
-              <a:t>11/23/2015</a:t>
+              <a:t>12/7/2015</a:t>
             </a:fld>
             <a:endParaRPr lang="en-US" dirty="0"/>
           </a:p>
@@ -3081,7 +2996,7 @@
           <a:p>
             <a:fld id="{455681A4-5ABE-4049-9281-FE6E3D21EF02}" type="datetime1">
               <a:rPr lang="en-US" smtClean="0"/>
-              <a:t>11/23/2015</a:t>
+              <a:t>12/7/2015</a:t>
             </a:fld>
             <a:endParaRPr lang="en-US" dirty="0"/>
           </a:p>
@@ -3272,7 +3187,7 @@
           <a:p>
             <a:fld id="{B7B6247C-1EF3-4169-97A3-32185EC46D20}" type="datetime1">
               <a:rPr lang="en-US" smtClean="0"/>
-              <a:t>11/23/2015</a:t>
+              <a:t>12/7/2015</a:t>
             </a:fld>
             <a:endParaRPr lang="en-US" dirty="0"/>
           </a:p>
@@ -3539,7 +3454,7 @@
           <a:p>
             <a:fld id="{4E4B7045-2F04-44F0-9495-EEEA140602D0}" type="datetime1">
               <a:rPr lang="en-US" smtClean="0"/>
-              <a:t>11/23/2015</a:t>
+              <a:t>12/7/2015</a:t>
             </a:fld>
             <a:endParaRPr lang="en-US" dirty="0"/>
           </a:p>
@@ -3848,7 +3763,7 @@
           <a:p>
             <a:fld id="{025C49C4-57A2-40B7-AA30-3457BC3A22F5}" type="datetime1">
               <a:rPr lang="en-US" smtClean="0"/>
-              <a:t>11/23/2015</a:t>
+              <a:t>12/7/2015</a:t>
             </a:fld>
             <a:endParaRPr lang="en-US" dirty="0"/>
           </a:p>
@@ -4291,7 +4206,7 @@
           <a:p>
             <a:fld id="{407A2FC3-E45B-4C79-8CE1-D6DB915489A4}" type="datetime1">
               <a:rPr lang="en-US" smtClean="0"/>
-              <a:t>11/23/2015</a:t>
+              <a:t>12/7/2015</a:t>
             </a:fld>
             <a:endParaRPr lang="en-US" dirty="0"/>
           </a:p>
@@ -4548,7 +4463,7 @@
           <a:p>
             <a:fld id="{61D173F4-E9B7-486B-A3A2-20A25FAC6DA9}" type="datetime1">
               <a:rPr lang="en-US" smtClean="0"/>
-              <a:t>11/23/2015</a:t>
+              <a:t>12/7/2015</a:t>
             </a:fld>
             <a:endParaRPr lang="en-US" dirty="0"/>
           </a:p>
@@ -5307,11 +5222,7 @@
             <a:pPr lvl="1"/>
             <a:r>
               <a:rPr lang="en-US" dirty="0" smtClean="0"/>
-              <a:t>Error </a:t>
-            </a:r>
-            <a:r>
-              <a:rPr lang="en-US" dirty="0" smtClean="0"/>
-              <a:t>prone</a:t>
+              <a:t>Error prone</a:t>
             </a:r>
           </a:p>
           <a:p>
@@ -5324,7 +5235,6 @@
               <a:rPr lang="en-US" dirty="0" smtClean="0"/>
               <a:t>heck all user input for errors</a:t>
             </a:r>
-            <a:endParaRPr lang="en-US" dirty="0" smtClean="0"/>
           </a:p>
         </p:txBody>
       </p:sp>
@@ -6035,151 +5945,6 @@
   <p:clrMapOvr>
     <a:masterClrMapping/>
   </p:clrMapOvr>
-</p:sld>
-</file>
-
-<file path=ppt/slides/slide8.xml><?xml version="1.0" encoding="utf-8"?>
-<p:sld xmlns:a="http://schemas.openxmlformats.org/drawingml/2006/main" xmlns:r="http://schemas.openxmlformats.org/officeDocument/2006/relationships" xmlns:p="http://schemas.openxmlformats.org/presentationml/2006/main" show="0">
-  <p:cSld>
-    <p:spTree>
-      <p:nvGrpSpPr>
-        <p:cNvPr id="1" name=""/>
-        <p:cNvGrpSpPr/>
-        <p:nvPr/>
-      </p:nvGrpSpPr>
-      <p:grpSpPr>
-        <a:xfrm>
-          <a:off x="0" y="0"/>
-          <a:ext cx="0" cy="0"/>
-          <a:chOff x="0" y="0"/>
-          <a:chExt cx="0" cy="0"/>
-        </a:xfrm>
-      </p:grpSpPr>
-      <p:sp>
-        <p:nvSpPr>
-          <p:cNvPr id="5" name="Title 4"/>
-          <p:cNvSpPr>
-            <a:spLocks noGrp="1"/>
-          </p:cNvSpPr>
-          <p:nvPr>
-            <p:ph type="title"/>
-          </p:nvPr>
-        </p:nvSpPr>
-        <p:spPr/>
-        <p:txBody>
-          <a:bodyPr/>
-          <a:lstStyle/>
-          <a:p>
-            <a:r>
-              <a:rPr lang="en-US" dirty="0"/>
-              <a:t>Thumper RESTful Control</a:t>
-            </a:r>
-          </a:p>
-        </p:txBody>
-      </p:sp>
-      <p:sp>
-        <p:nvSpPr>
-          <p:cNvPr id="6" name="Content Placeholder 5"/>
-          <p:cNvSpPr>
-            <a:spLocks noGrp="1"/>
-          </p:cNvSpPr>
-          <p:nvPr>
-            <p:ph idx="1"/>
-          </p:nvPr>
-        </p:nvSpPr>
-        <p:spPr/>
-        <p:txBody>
-          <a:bodyPr/>
-          <a:lstStyle/>
-          <a:p>
-            <a:r>
-              <a:rPr lang="en-US" dirty="0" smtClean="0"/>
-              <a:t>The Thumper drive control has a timeout of 500ms</a:t>
-            </a:r>
-          </a:p>
-          <a:p>
-            <a:pPr lvl="1"/>
-            <a:r>
-              <a:rPr lang="en-US" dirty="0" smtClean="0"/>
-              <a:t>This means that when drive is initiated and no command is received for 500ms, the </a:t>
-            </a:r>
-            <a:r>
-              <a:rPr lang="en-US" dirty="0" err="1" smtClean="0"/>
-              <a:t>TRex</a:t>
-            </a:r>
-            <a:r>
-              <a:rPr lang="en-US" dirty="0" smtClean="0"/>
-              <a:t> controller is automatically shut down</a:t>
-            </a:r>
-          </a:p>
-          <a:p>
-            <a:pPr lvl="1"/>
-            <a:r>
-              <a:rPr lang="en-US" dirty="0" smtClean="0"/>
-              <a:t>To take this into account you will need to make use of a timer to resend a drive command every x milliseconds</a:t>
-            </a:r>
-          </a:p>
-          <a:p>
-            <a:pPr lvl="2"/>
-            <a:r>
-              <a:rPr lang="en-US" dirty="0" smtClean="0"/>
-              <a:t>Do not make x overly small as it will flood the controller and crash the i2c bus</a:t>
-            </a:r>
-          </a:p>
-          <a:p>
-            <a:pPr lvl="2"/>
-            <a:r>
-              <a:rPr lang="en-US" dirty="0" smtClean="0"/>
-              <a:t>This parameter should be added to the application settings</a:t>
-            </a:r>
-            <a:endParaRPr lang="en-US" dirty="0"/>
-          </a:p>
-          <a:p>
-            <a:endParaRPr lang="en-US" dirty="0" smtClean="0"/>
-          </a:p>
-        </p:txBody>
-      </p:sp>
-      <p:sp>
-        <p:nvSpPr>
-          <p:cNvPr id="4" name="Slide Number Placeholder 3"/>
-          <p:cNvSpPr>
-            <a:spLocks noGrp="1"/>
-          </p:cNvSpPr>
-          <p:nvPr>
-            <p:ph type="sldNum" sz="quarter" idx="12"/>
-          </p:nvPr>
-        </p:nvSpPr>
-        <p:spPr/>
-        <p:txBody>
-          <a:bodyPr/>
-          <a:lstStyle/>
-          <a:p>
-            <a:fld id="{52DB1A75-B9BE-46B1-B482-5F96E51FA4B2}" type="slidenum">
-              <a:rPr lang="en-US" smtClean="0"/>
-              <a:t>8</a:t>
-            </a:fld>
-            <a:endParaRPr lang="en-US" dirty="0"/>
-          </a:p>
-        </p:txBody>
-      </p:sp>
-    </p:spTree>
-    <p:extLst>
-      <p:ext uri="{BB962C8B-B14F-4D97-AF65-F5344CB8AC3E}">
-        <p14:creationId xmlns:p14="http://schemas.microsoft.com/office/powerpoint/2010/main" val="4022884511"/>
-      </p:ext>
-    </p:extLst>
-  </p:cSld>
-  <p:clrMapOvr>
-    <a:masterClrMapping/>
-  </p:clrMapOvr>
-  <mc:AlternateContent xmlns:mc="http://schemas.openxmlformats.org/markup-compatibility/2006" xmlns:p14="http://schemas.microsoft.com/office/powerpoint/2010/main">
-    <mc:Choice Requires="p14">
-      <p:transition spd="slow" p14:dur="2000"/>
-    </mc:Choice>
-    <mc:Fallback xmlns="">
-      <p:transition spd="slow"/>
-    </mc:Fallback>
-  </mc:AlternateContent>
 </p:sld>
 </file>
 

</xml_diff>